<commit_message>
Added link to code examples
</commit_message>
<xml_diff>
--- a/STA-491-PC-F21/4 - Functions.pptx
+++ b/STA-491-PC-F21/4 - Functions.pptx
@@ -17184,8 +17184,8 @@
         </p:nvSpPr>
         <p:spPr>
           <a:xfrm>
-            <a:off x="1369503" y="3573602"/>
-            <a:ext cx="6094602" cy="369332"/>
+            <a:off x="1923175" y="4990851"/>
+            <a:ext cx="9846579" cy="1200329"/>
           </a:xfrm>
           <a:prstGeom prst="rect">
             <a:avLst/>
@@ -17199,12 +17199,43 @@
           <a:lstStyle/>
           <a:p>
             <a:r>
+              <a:rPr lang="en-US" sz="1800" b="1" dirty="0">
+                <a:solidFill>
+                  <a:schemeClr val="bg1"/>
+                </a:solidFill>
+              </a:rPr>
+              <a:t>Answer: </a:t>
+            </a:r>
+            <a:r>
               <a:rPr lang="en-US" sz="1800" dirty="0">
                 <a:solidFill>
                   <a:schemeClr val="bg1"/>
                 </a:solidFill>
-              </a:rPr>
-              <a:t>Answer: </a:t>
+                <a:hlinkClick r:id="rId2"/>
+              </a:rPr>
+              <a:t>https://editor.p5js.org/scotchANDsolder/collections/mAmAcn6Su</a:t>
+            </a:r>
+            <a:endParaRPr lang="en-US" sz="1800" dirty="0">
+              <a:solidFill>
+                <a:schemeClr val="bg1"/>
+              </a:solidFill>
+            </a:endParaRPr>
+          </a:p>
+          <a:p>
+            <a:endParaRPr lang="en-US" dirty="0">
+              <a:solidFill>
+                <a:schemeClr val="bg1"/>
+              </a:solidFill>
+            </a:endParaRPr>
+          </a:p>
+          <a:p>
+            <a:r>
+              <a:rPr lang="en-US" sz="1800" dirty="0">
+                <a:solidFill>
+                  <a:schemeClr val="bg1"/>
+                </a:solidFill>
+              </a:rPr>
+              <a:t>NOTE: I will be saving in class code examples. You can access them using the link above. I have also put this on the homepage of the class website for easy access/</a:t>
             </a:r>
           </a:p>
         </p:txBody>
@@ -17665,7 +17696,7 @@
         <p:spPr>
           <a:xfrm>
             <a:off x="6773966" y="2072322"/>
-            <a:ext cx="4509227" cy="2677656"/>
+            <a:ext cx="4509227" cy="2308324"/>
           </a:xfrm>
           <a:prstGeom prst="rect">
             <a:avLst/>
@@ -17701,7 +17732,7 @@
                   <a:schemeClr val="bg1"/>
                 </a:solidFill>
               </a:rPr>
-              <a:t>Let’s recreate this using functions</a:t>
+              <a:t>Let’s recreate this Vera Molnar drawing using functions</a:t>
             </a:r>
           </a:p>
           <a:p>
@@ -17710,23 +17741,6 @@
                 <a:schemeClr val="bg1"/>
               </a:solidFill>
             </a:endParaRPr>
-          </a:p>
-          <a:p>
-            <a:endParaRPr lang="en-US" sz="2400" dirty="0">
-              <a:solidFill>
-                <a:schemeClr val="bg1"/>
-              </a:solidFill>
-            </a:endParaRPr>
-          </a:p>
-          <a:p>
-            <a:r>
-              <a:rPr lang="en-US" sz="2400" dirty="0">
-                <a:solidFill>
-                  <a:schemeClr val="bg1"/>
-                </a:solidFill>
-              </a:rPr>
-              <a:t>Answer: </a:t>
-            </a:r>
           </a:p>
         </p:txBody>
       </p:sp>
@@ -20218,12 +20232,9 @@
 </file>
 
 <file path=customXml/item1.xml><?xml version="1.0" encoding="utf-8"?>
-<?mso-contentType ?>
-<FormTemplates xmlns="http://schemas.microsoft.com/sharepoint/v3/contenttype/forms">
-  <Display>DocumentLibraryForm</Display>
-  <Edit>DocumentLibraryForm</Edit>
-  <New>DocumentLibraryForm</New>
-</FormTemplates>
+<p:properties xmlns:p="http://schemas.microsoft.com/office/2006/metadata/properties" xmlns:xsi="http://www.w3.org/2001/XMLSchema-instance" xmlns:pc="http://schemas.microsoft.com/office/infopath/2007/PartnerControls">
+  <documentManagement/>
+</p:properties>
 </file>
 
 <file path=customXml/item2.xml><?xml version="1.0" encoding="utf-8"?>
@@ -20412,15 +20423,27 @@
 </file>
 
 <file path=customXml/item3.xml><?xml version="1.0" encoding="utf-8"?>
-<p:properties xmlns:p="http://schemas.microsoft.com/office/2006/metadata/properties" xmlns:xsi="http://www.w3.org/2001/XMLSchema-instance" xmlns:pc="http://schemas.microsoft.com/office/infopath/2007/PartnerControls">
-  <documentManagement/>
-</p:properties>
+<?mso-contentType ?>
+<FormTemplates xmlns="http://schemas.microsoft.com/sharepoint/v3/contenttype/forms">
+  <Display>DocumentLibraryForm</Display>
+  <Edit>DocumentLibraryForm</Edit>
+  <New>DocumentLibraryForm</New>
+</FormTemplates>
 </file>
 
 <file path=customXml/itemProps1.xml><?xml version="1.0" encoding="utf-8"?>
-<ds:datastoreItem xmlns:ds="http://schemas.openxmlformats.org/officeDocument/2006/customXml" ds:itemID="{30011791-DDFA-47A0-AD1F-41FE8474C0EC}">
+<ds:datastoreItem xmlns:ds="http://schemas.openxmlformats.org/officeDocument/2006/customXml" ds:itemID="{D77166A1-332D-4088-BCD3-CEBE89D2B1FE}">
   <ds:schemaRefs>
-    <ds:schemaRef ds:uri="http://schemas.microsoft.com/sharepoint/v3/contenttype/forms"/>
+    <ds:schemaRef ds:uri="http://purl.org/dc/elements/1.1/"/>
+    <ds:schemaRef ds:uri="http://www.w3.org/XML/1998/namespace"/>
+    <ds:schemaRef ds:uri="27f5b930-c5a1-440e-b577-567b15b72b75"/>
+    <ds:schemaRef ds:uri="http://schemas.microsoft.com/office/infopath/2007/PartnerControls"/>
+    <ds:schemaRef ds:uri="cd174ddd-0451-4af8-ad43-5fbbe8b32ab0"/>
+    <ds:schemaRef ds:uri="http://purl.org/dc/dcmitype/"/>
+    <ds:schemaRef ds:uri="http://schemas.microsoft.com/office/2006/documentManagement/types"/>
+    <ds:schemaRef ds:uri="http://schemas.openxmlformats.org/package/2006/metadata/core-properties"/>
+    <ds:schemaRef ds:uri="http://schemas.microsoft.com/office/2006/metadata/properties"/>
+    <ds:schemaRef ds:uri="http://purl.org/dc/terms/"/>
   </ds:schemaRefs>
 </ds:datastoreItem>
 </file>
@@ -20445,18 +20468,9 @@
 </file>
 
 <file path=customXml/itemProps3.xml><?xml version="1.0" encoding="utf-8"?>
-<ds:datastoreItem xmlns:ds="http://schemas.openxmlformats.org/officeDocument/2006/customXml" ds:itemID="{D77166A1-332D-4088-BCD3-CEBE89D2B1FE}">
+<ds:datastoreItem xmlns:ds="http://schemas.openxmlformats.org/officeDocument/2006/customXml" ds:itemID="{30011791-DDFA-47A0-AD1F-41FE8474C0EC}">
   <ds:schemaRefs>
-    <ds:schemaRef ds:uri="http://purl.org/dc/elements/1.1/"/>
-    <ds:schemaRef ds:uri="http://www.w3.org/XML/1998/namespace"/>
-    <ds:schemaRef ds:uri="27f5b930-c5a1-440e-b577-567b15b72b75"/>
-    <ds:schemaRef ds:uri="http://schemas.microsoft.com/office/infopath/2007/PartnerControls"/>
-    <ds:schemaRef ds:uri="cd174ddd-0451-4af8-ad43-5fbbe8b32ab0"/>
-    <ds:schemaRef ds:uri="http://purl.org/dc/dcmitype/"/>
-    <ds:schemaRef ds:uri="http://schemas.microsoft.com/office/2006/documentManagement/types"/>
-    <ds:schemaRef ds:uri="http://schemas.openxmlformats.org/package/2006/metadata/core-properties"/>
-    <ds:schemaRef ds:uri="http://schemas.microsoft.com/office/2006/metadata/properties"/>
-    <ds:schemaRef ds:uri="http://purl.org/dc/terms/"/>
+    <ds:schemaRef ds:uri="http://schemas.microsoft.com/sharepoint/v3/contenttype/forms"/>
   </ds:schemaRefs>
 </ds:datastoreItem>
 </file>
</xml_diff>